<commit_message>
15h46 2 june 2017
</commit_message>
<xml_diff>
--- a/Win Form RFID database.pptx
+++ b/Win Form RFID database.pptx
@@ -8,6 +8,7 @@
     <p:sldId id="256" r:id="rId2"/>
     <p:sldId id="257" r:id="rId3"/>
     <p:sldId id="258" r:id="rId4"/>
+    <p:sldId id="259" r:id="rId5"/>
   </p:sldIdLst>
   <p:sldSz cx="12192000" cy="6858000"/>
   <p:notesSz cx="6858000" cy="9144000"/>
@@ -245,7 +246,7 @@
           <a:p>
             <a:fld id="{8DF1ABD9-C2A9-4F99-BD29-B3A04C828CB9}" type="datetimeFigureOut">
               <a:rPr lang="en-US" smtClean="0"/>
-              <a:t>5/25/2017</a:t>
+              <a:t>6/1/2017</a:t>
             </a:fld>
             <a:endParaRPr lang="en-US"/>
           </a:p>
@@ -415,7 +416,7 @@
           <a:p>
             <a:fld id="{8DF1ABD9-C2A9-4F99-BD29-B3A04C828CB9}" type="datetimeFigureOut">
               <a:rPr lang="en-US" smtClean="0"/>
-              <a:t>5/25/2017</a:t>
+              <a:t>6/1/2017</a:t>
             </a:fld>
             <a:endParaRPr lang="en-US"/>
           </a:p>
@@ -595,7 +596,7 @@
           <a:p>
             <a:fld id="{8DF1ABD9-C2A9-4F99-BD29-B3A04C828CB9}" type="datetimeFigureOut">
               <a:rPr lang="en-US" smtClean="0"/>
-              <a:t>5/25/2017</a:t>
+              <a:t>6/1/2017</a:t>
             </a:fld>
             <a:endParaRPr lang="en-US"/>
           </a:p>
@@ -765,7 +766,7 @@
           <a:p>
             <a:fld id="{8DF1ABD9-C2A9-4F99-BD29-B3A04C828CB9}" type="datetimeFigureOut">
               <a:rPr lang="en-US" smtClean="0"/>
-              <a:t>5/25/2017</a:t>
+              <a:t>6/1/2017</a:t>
             </a:fld>
             <a:endParaRPr lang="en-US"/>
           </a:p>
@@ -1011,7 +1012,7 @@
           <a:p>
             <a:fld id="{8DF1ABD9-C2A9-4F99-BD29-B3A04C828CB9}" type="datetimeFigureOut">
               <a:rPr lang="en-US" smtClean="0"/>
-              <a:t>5/25/2017</a:t>
+              <a:t>6/1/2017</a:t>
             </a:fld>
             <a:endParaRPr lang="en-US"/>
           </a:p>
@@ -1243,7 +1244,7 @@
           <a:p>
             <a:fld id="{8DF1ABD9-C2A9-4F99-BD29-B3A04C828CB9}" type="datetimeFigureOut">
               <a:rPr lang="en-US" smtClean="0"/>
-              <a:t>5/25/2017</a:t>
+              <a:t>6/1/2017</a:t>
             </a:fld>
             <a:endParaRPr lang="en-US"/>
           </a:p>
@@ -1610,7 +1611,7 @@
           <a:p>
             <a:fld id="{8DF1ABD9-C2A9-4F99-BD29-B3A04C828CB9}" type="datetimeFigureOut">
               <a:rPr lang="en-US" smtClean="0"/>
-              <a:t>5/25/2017</a:t>
+              <a:t>6/1/2017</a:t>
             </a:fld>
             <a:endParaRPr lang="en-US"/>
           </a:p>
@@ -1728,7 +1729,7 @@
           <a:p>
             <a:fld id="{8DF1ABD9-C2A9-4F99-BD29-B3A04C828CB9}" type="datetimeFigureOut">
               <a:rPr lang="en-US" smtClean="0"/>
-              <a:t>5/25/2017</a:t>
+              <a:t>6/1/2017</a:t>
             </a:fld>
             <a:endParaRPr lang="en-US"/>
           </a:p>
@@ -1823,7 +1824,7 @@
           <a:p>
             <a:fld id="{8DF1ABD9-C2A9-4F99-BD29-B3A04C828CB9}" type="datetimeFigureOut">
               <a:rPr lang="en-US" smtClean="0"/>
-              <a:t>5/25/2017</a:t>
+              <a:t>6/1/2017</a:t>
             </a:fld>
             <a:endParaRPr lang="en-US"/>
           </a:p>
@@ -2100,7 +2101,7 @@
           <a:p>
             <a:fld id="{8DF1ABD9-C2A9-4F99-BD29-B3A04C828CB9}" type="datetimeFigureOut">
               <a:rPr lang="en-US" smtClean="0"/>
-              <a:t>5/25/2017</a:t>
+              <a:t>6/1/2017</a:t>
             </a:fld>
             <a:endParaRPr lang="en-US"/>
           </a:p>
@@ -2353,7 +2354,7 @@
           <a:p>
             <a:fld id="{8DF1ABD9-C2A9-4F99-BD29-B3A04C828CB9}" type="datetimeFigureOut">
               <a:rPr lang="en-US" smtClean="0"/>
-              <a:t>5/25/2017</a:t>
+              <a:t>6/1/2017</a:t>
             </a:fld>
             <a:endParaRPr lang="en-US"/>
           </a:p>
@@ -2566,7 +2567,7 @@
           <a:p>
             <a:fld id="{8DF1ABD9-C2A9-4F99-BD29-B3A04C828CB9}" type="datetimeFigureOut">
               <a:rPr lang="en-US" smtClean="0"/>
-              <a:t>5/25/2017</a:t>
+              <a:t>6/1/2017</a:t>
             </a:fld>
             <a:endParaRPr lang="en-US"/>
           </a:p>
@@ -4716,6 +4717,166 @@
 </p:sld>
 </file>
 
+<file path=ppt/slides/slide4.xml><?xml version="1.0" encoding="utf-8"?>
+<p:sld xmlns:a="http://schemas.openxmlformats.org/drawingml/2006/main" xmlns:r="http://schemas.openxmlformats.org/officeDocument/2006/relationships" xmlns:p="http://schemas.openxmlformats.org/presentationml/2006/main">
+  <p:cSld>
+    <p:spTree>
+      <p:nvGrpSpPr>
+        <p:cNvPr id="1" name=""/>
+        <p:cNvGrpSpPr/>
+        <p:nvPr/>
+      </p:nvGrpSpPr>
+      <p:grpSpPr>
+        <a:xfrm>
+          <a:off x="0" y="0"/>
+          <a:ext cx="0" cy="0"/>
+          <a:chOff x="0" y="0"/>
+          <a:chExt cx="0" cy="0"/>
+        </a:xfrm>
+      </p:grpSpPr>
+      <p:sp>
+        <p:nvSpPr>
+          <p:cNvPr id="2" name="Title 1"/>
+          <p:cNvSpPr>
+            <a:spLocks noGrp="1"/>
+          </p:cNvSpPr>
+          <p:nvPr>
+            <p:ph type="title"/>
+          </p:nvPr>
+        </p:nvSpPr>
+        <p:spPr>
+          <a:xfrm>
+            <a:off x="633483" y="0"/>
+            <a:ext cx="9547746" cy="986003"/>
+          </a:xfrm>
+        </p:spPr>
+        <p:txBody>
+          <a:bodyPr/>
+          <a:lstStyle/>
+          <a:p>
+            <a:r>
+              <a:rPr lang="en-US" dirty="0" smtClean="0"/>
+              <a:t>1.6.2016</a:t>
+            </a:r>
+            <a:endParaRPr lang="en-US" dirty="0"/>
+          </a:p>
+        </p:txBody>
+      </p:sp>
+      <p:sp>
+        <p:nvSpPr>
+          <p:cNvPr id="3" name="Content Placeholder 2"/>
+          <p:cNvSpPr>
+            <a:spLocks noGrp="1"/>
+          </p:cNvSpPr>
+          <p:nvPr>
+            <p:ph idx="1"/>
+          </p:nvPr>
+        </p:nvSpPr>
+        <p:spPr>
+          <a:xfrm>
+            <a:off x="464024" y="986003"/>
+            <a:ext cx="11218460" cy="5190960"/>
+          </a:xfrm>
+        </p:spPr>
+        <p:txBody>
+          <a:bodyPr/>
+          <a:lstStyle/>
+          <a:p>
+            <a:pPr marL="0" indent="0">
+              <a:buNone/>
+            </a:pPr>
+            <a:r>
+              <a:rPr lang="en-US" dirty="0" smtClean="0"/>
+              <a:t>after long delay. now I have time to work on this project again.</a:t>
+            </a:r>
+          </a:p>
+          <a:p>
+            <a:pPr marL="0" indent="0">
+              <a:buNone/>
+            </a:pPr>
+            <a:endParaRPr lang="en-US" dirty="0"/>
+          </a:p>
+          <a:p>
+            <a:pPr marL="0" indent="0">
+              <a:buNone/>
+            </a:pPr>
+            <a:r>
+              <a:rPr lang="en-US" dirty="0" smtClean="0"/>
+              <a:t>My database doesn’t have Primary ID. For clearly specifying which Row to modify or delete. etc…</a:t>
+            </a:r>
+          </a:p>
+          <a:p>
+            <a:pPr marL="0" indent="0">
+              <a:buNone/>
+            </a:pPr>
+            <a:endParaRPr lang="en-US" dirty="0" smtClean="0"/>
+          </a:p>
+          <a:p>
+            <a:pPr marL="0" indent="0">
+              <a:buNone/>
+            </a:pPr>
+            <a:r>
+              <a:rPr lang="en-US" dirty="0" smtClean="0"/>
+              <a:t>Clip </a:t>
+            </a:r>
+            <a:r>
+              <a:rPr lang="en-US" dirty="0" err="1" smtClean="0"/>
+              <a:t>Huong</a:t>
+            </a:r>
+            <a:r>
+              <a:rPr lang="en-US" dirty="0" smtClean="0"/>
+              <a:t> </a:t>
+            </a:r>
+            <a:r>
+              <a:rPr lang="en-US" dirty="0" err="1" smtClean="0"/>
+              <a:t>dan</a:t>
+            </a:r>
+            <a:r>
+              <a:rPr lang="en-US" dirty="0" smtClean="0"/>
+              <a:t> them </a:t>
+            </a:r>
+            <a:r>
+              <a:rPr lang="en-US" dirty="0" err="1" smtClean="0"/>
+              <a:t>sua</a:t>
+            </a:r>
+            <a:r>
+              <a:rPr lang="en-US" dirty="0" smtClean="0"/>
+              <a:t> </a:t>
+            </a:r>
+            <a:r>
+              <a:rPr lang="en-US" dirty="0" err="1" smtClean="0"/>
+              <a:t>xoa</a:t>
+            </a:r>
+            <a:r>
+              <a:rPr lang="en-US" dirty="0" smtClean="0"/>
+              <a:t> C# co ban.</a:t>
+            </a:r>
+            <a:endParaRPr lang="en-US" dirty="0"/>
+          </a:p>
+          <a:p>
+            <a:pPr marL="0" indent="0">
+              <a:buNone/>
+            </a:pPr>
+            <a:r>
+              <a:rPr lang="en-US" dirty="0"/>
+              <a:t>https://www.youtube.com/watch?v=DcievNVyyZM</a:t>
+            </a:r>
+          </a:p>
+        </p:txBody>
+      </p:sp>
+    </p:spTree>
+    <p:extLst>
+      <p:ext uri="{BB962C8B-B14F-4D97-AF65-F5344CB8AC3E}">
+        <p14:creationId xmlns:p14="http://schemas.microsoft.com/office/powerpoint/2010/main" val="3942857932"/>
+      </p:ext>
+    </p:extLst>
+  </p:cSld>
+  <p:clrMapOvr>
+    <a:masterClrMapping/>
+  </p:clrMapOvr>
+</p:sld>
+</file>
+
 <file path=ppt/theme/theme1.xml><?xml version="1.0" encoding="utf-8"?>
 <a:theme xmlns:a="http://schemas.openxmlformats.org/drawingml/2006/main" name="Office Theme">
   <a:themeElements>

</xml_diff>